<commit_message>
add poster presentation templates to the website
</commit_message>
<xml_diff>
--- a/new/docs/posterTemp.pptx
+++ b/new/docs/posterTemp.pptx
@@ -4033,7 +4033,7 @@
           <p:cNvPr id="22" name="Content Placeholder 95">
             <a:extLst>
               <a:ext uri="{FF2B5EF4-FFF2-40B4-BE49-F238E27FC236}">
-                <a16:creationId xmlns="" xmlns:a16="http://schemas.microsoft.com/office/drawing/2014/main" id="{604FDFA6-3867-48F0-AF0B-C0886374C85A}"/>
+                <a16:creationId xmlns:a16="http://schemas.microsoft.com/office/drawing/2014/main" xmlns="" id="{604FDFA6-3867-48F0-AF0B-C0886374C85A}"/>
               </a:ext>
             </a:extLst>
           </p:cNvPr>
@@ -4844,7 +4844,7 @@
           <p:cNvPr id="21" name="Data Table " descr="Table 1">
             <a:extLst>
               <a:ext uri="{FF2B5EF4-FFF2-40B4-BE49-F238E27FC236}">
-                <a16:creationId xmlns:a16="http://schemas.microsoft.com/office/drawing/2014/main" xmlns="" id="{32D44B4F-618F-427D-9B6A-5B20AC8DE682}"/>
+                <a16:creationId xmlns="" xmlns:a16="http://schemas.microsoft.com/office/drawing/2014/main" id="{32D44B4F-618F-427D-9B6A-5B20AC8DE682}"/>
               </a:ext>
             </a:extLst>
           </p:cNvPr>
@@ -4873,28 +4873,28 @@
                 <a:gridCol w="3191568">
                   <a:extLst>
                     <a:ext uri="{9D8B030D-6E8A-4147-A177-3AD203B41FA5}">
-                      <a16:colId xmlns:a16="http://schemas.microsoft.com/office/drawing/2014/main" xmlns="" val="20000"/>
+                      <a16:colId xmlns="" xmlns:a16="http://schemas.microsoft.com/office/drawing/2014/main" val="20000"/>
                     </a:ext>
                   </a:extLst>
                 </a:gridCol>
                 <a:gridCol w="3568522">
                   <a:extLst>
                     <a:ext uri="{9D8B030D-6E8A-4147-A177-3AD203B41FA5}">
-                      <a16:colId xmlns:a16="http://schemas.microsoft.com/office/drawing/2014/main" xmlns="" val="20001"/>
+                      <a16:colId xmlns="" xmlns:a16="http://schemas.microsoft.com/office/drawing/2014/main" val="20001"/>
                     </a:ext>
                   </a:extLst>
                 </a:gridCol>
                 <a:gridCol w="3166441">
                   <a:extLst>
                     <a:ext uri="{9D8B030D-6E8A-4147-A177-3AD203B41FA5}">
-                      <a16:colId xmlns:a16="http://schemas.microsoft.com/office/drawing/2014/main" xmlns="" val="20002"/>
+                      <a16:colId xmlns="" xmlns:a16="http://schemas.microsoft.com/office/drawing/2014/main" val="20002"/>
                     </a:ext>
                   </a:extLst>
                 </a:gridCol>
                 <a:gridCol w="3744433">
                   <a:extLst>
                     <a:ext uri="{9D8B030D-6E8A-4147-A177-3AD203B41FA5}">
-                      <a16:colId xmlns:a16="http://schemas.microsoft.com/office/drawing/2014/main" xmlns="" val="20003"/>
+                      <a16:colId xmlns="" xmlns:a16="http://schemas.microsoft.com/office/drawing/2014/main" val="20003"/>
                     </a:ext>
                   </a:extLst>
                 </a:gridCol>
@@ -5152,7 +5152,7 @@
                 </a:tc>
                 <a:extLst>
                   <a:ext uri="{0D108BD9-81ED-4DB2-BD59-A6C34878D82A}">
-                    <a16:rowId xmlns:a16="http://schemas.microsoft.com/office/drawing/2014/main" xmlns="" val="10000"/>
+                    <a16:rowId xmlns="" xmlns:a16="http://schemas.microsoft.com/office/drawing/2014/main" val="10000"/>
                   </a:ext>
                 </a:extLst>
               </a:tr>
@@ -5419,7 +5419,7 @@
                 </a:tc>
                 <a:extLst>
                   <a:ext uri="{0D108BD9-81ED-4DB2-BD59-A6C34878D82A}">
-                    <a16:rowId xmlns:a16="http://schemas.microsoft.com/office/drawing/2014/main" xmlns="" val="10001"/>
+                    <a16:rowId xmlns="" xmlns:a16="http://schemas.microsoft.com/office/drawing/2014/main" val="10001"/>
                   </a:ext>
                 </a:extLst>
               </a:tr>
@@ -5694,7 +5694,7 @@
                 </a:tc>
                 <a:extLst>
                   <a:ext uri="{0D108BD9-81ED-4DB2-BD59-A6C34878D82A}">
-                    <a16:rowId xmlns:a16="http://schemas.microsoft.com/office/drawing/2014/main" xmlns="" val="10002"/>
+                    <a16:rowId xmlns="" xmlns:a16="http://schemas.microsoft.com/office/drawing/2014/main" val="10002"/>
                   </a:ext>
                 </a:extLst>
               </a:tr>
@@ -5969,7 +5969,7 @@
                 </a:tc>
                 <a:extLst>
                   <a:ext uri="{0D108BD9-81ED-4DB2-BD59-A6C34878D82A}">
-                    <a16:rowId xmlns:a16="http://schemas.microsoft.com/office/drawing/2014/main" xmlns="" val="10003"/>
+                    <a16:rowId xmlns="" xmlns:a16="http://schemas.microsoft.com/office/drawing/2014/main" val="10003"/>
                   </a:ext>
                 </a:extLst>
               </a:tr>
@@ -6244,7 +6244,7 @@
                 </a:tc>
                 <a:extLst>
                   <a:ext uri="{0D108BD9-81ED-4DB2-BD59-A6C34878D82A}">
-                    <a16:rowId xmlns:a16="http://schemas.microsoft.com/office/drawing/2014/main" xmlns="" val="10004"/>
+                    <a16:rowId xmlns="" xmlns:a16="http://schemas.microsoft.com/office/drawing/2014/main" val="10004"/>
                   </a:ext>
                 </a:extLst>
               </a:tr>
@@ -6511,7 +6511,7 @@
                 </a:tc>
                 <a:extLst>
                   <a:ext uri="{0D108BD9-81ED-4DB2-BD59-A6C34878D82A}">
-                    <a16:rowId xmlns:a16="http://schemas.microsoft.com/office/drawing/2014/main" xmlns="" val="10005"/>
+                    <a16:rowId xmlns="" xmlns:a16="http://schemas.microsoft.com/office/drawing/2014/main" val="10005"/>
                   </a:ext>
                 </a:extLst>
               </a:tr>
@@ -6524,7 +6524,7 @@
           <p:cNvPr id="23" name="Content Placeholder 92">
             <a:extLst>
               <a:ext uri="{FF2B5EF4-FFF2-40B4-BE49-F238E27FC236}">
-                <a16:creationId xmlns="" xmlns:a16="http://schemas.microsoft.com/office/drawing/2014/main" id="{CD429459-56A1-49C8-BDCA-6BF803974182}"/>
+                <a16:creationId xmlns:a16="http://schemas.microsoft.com/office/drawing/2014/main" xmlns="" id="{CD429459-56A1-49C8-BDCA-6BF803974182}"/>
               </a:ext>
             </a:extLst>
           </p:cNvPr>
@@ -6970,7 +6970,7 @@
           <p:cNvPr id="26" name="Content Placeholder 95">
             <a:extLst>
               <a:ext uri="{FF2B5EF4-FFF2-40B4-BE49-F238E27FC236}">
-                <a16:creationId xmlns="" xmlns:a16="http://schemas.microsoft.com/office/drawing/2014/main" id="{604FDFA6-3867-48F0-AF0B-C0886374C85A}"/>
+                <a16:creationId xmlns:a16="http://schemas.microsoft.com/office/drawing/2014/main" xmlns="" id="{604FDFA6-3867-48F0-AF0B-C0886374C85A}"/>
               </a:ext>
             </a:extLst>
           </p:cNvPr>
@@ -7312,7 +7312,7 @@
           <p:cNvPr id="27" name="Content Placeholder 95">
             <a:extLst>
               <a:ext uri="{FF2B5EF4-FFF2-40B4-BE49-F238E27FC236}">
-                <a16:creationId xmlns="" xmlns:a16="http://schemas.microsoft.com/office/drawing/2014/main" id="{604FDFA6-3867-48F0-AF0B-C0886374C85A}"/>
+                <a16:creationId xmlns:a16="http://schemas.microsoft.com/office/drawing/2014/main" xmlns="" id="{604FDFA6-3867-48F0-AF0B-C0886374C85A}"/>
               </a:ext>
             </a:extLst>
           </p:cNvPr>
@@ -7543,7 +7543,7 @@
           <p:cNvPr id="28" name="Content Placeholder 95">
             <a:extLst>
               <a:ext uri="{FF2B5EF4-FFF2-40B4-BE49-F238E27FC236}">
-                <a16:creationId xmlns="" xmlns:a16="http://schemas.microsoft.com/office/drawing/2014/main" id="{604FDFA6-3867-48F0-AF0B-C0886374C85A}"/>
+                <a16:creationId xmlns:a16="http://schemas.microsoft.com/office/drawing/2014/main" xmlns="" id="{604FDFA6-3867-48F0-AF0B-C0886374C85A}"/>
               </a:ext>
             </a:extLst>
           </p:cNvPr>
@@ -7806,7 +7806,7 @@
             <p:cNvPr id="29" name="Horizontal Section Divider" descr="Horizontal Divider">
               <a:extLst>
                 <a:ext uri="{FF2B5EF4-FFF2-40B4-BE49-F238E27FC236}">
-                  <a16:creationId xmlns="" xmlns:a16="http://schemas.microsoft.com/office/drawing/2014/main" id="{4E4A0ECF-1721-4D14-A87E-1CA7298CE609}"/>
+                  <a16:creationId xmlns:a16="http://schemas.microsoft.com/office/drawing/2014/main" xmlns="" id="{4E4A0ECF-1721-4D14-A87E-1CA7298CE609}"/>
                 </a:ext>
               </a:extLst>
             </p:cNvPr>
@@ -7841,7 +7841,7 @@
             <p:cNvPr id="30" name="Bullet B" descr="B">
               <a:extLst>
                 <a:ext uri="{FF2B5EF4-FFF2-40B4-BE49-F238E27FC236}">
-                  <a16:creationId xmlns="" xmlns:a16="http://schemas.microsoft.com/office/drawing/2014/main" id="{E96A507C-9D5F-436E-A44C-D0FE6E561AA2}"/>
+                  <a16:creationId xmlns:a16="http://schemas.microsoft.com/office/drawing/2014/main" xmlns="" id="{E96A507C-9D5F-436E-A44C-D0FE6E561AA2}"/>
                 </a:ext>
               </a:extLst>
             </p:cNvPr>
@@ -7877,7 +7877,7 @@
             <p:cNvPr id="31" name="Chart B" descr="Chart B">
               <a:extLst>
                 <a:ext uri="{FF2B5EF4-FFF2-40B4-BE49-F238E27FC236}">
-                  <a16:creationId xmlns="" xmlns:a16="http://schemas.microsoft.com/office/drawing/2014/main" id="{4A43E018-FCB5-4328-A2A6-F68CA83B1220}"/>
+                  <a16:creationId xmlns:a16="http://schemas.microsoft.com/office/drawing/2014/main" xmlns="" id="{4A43E018-FCB5-4328-A2A6-F68CA83B1220}"/>
                 </a:ext>
               </a:extLst>
             </p:cNvPr>
@@ -7907,7 +7907,7 @@
             <p:cNvPr id="32" name="Vertical Section Divider" descr="Vertical Divider">
               <a:extLst>
                 <a:ext uri="{FF2B5EF4-FFF2-40B4-BE49-F238E27FC236}">
-                  <a16:creationId xmlns="" xmlns:a16="http://schemas.microsoft.com/office/drawing/2014/main" id="{E4ADC138-F3B0-4BA4-B52F-C538CC195447}"/>
+                  <a16:creationId xmlns:a16="http://schemas.microsoft.com/office/drawing/2014/main" xmlns="" id="{E4ADC138-F3B0-4BA4-B52F-C538CC195447}"/>
                 </a:ext>
               </a:extLst>
             </p:cNvPr>
@@ -7942,7 +7942,7 @@
             <p:cNvPr id="33" name="Bullet C" descr="C">
               <a:extLst>
                 <a:ext uri="{FF2B5EF4-FFF2-40B4-BE49-F238E27FC236}">
-                  <a16:creationId xmlns="" xmlns:a16="http://schemas.microsoft.com/office/drawing/2014/main" id="{27B76F85-1E44-45D7-9EB6-0A1E48C4C27D}"/>
+                  <a16:creationId xmlns:a16="http://schemas.microsoft.com/office/drawing/2014/main" xmlns="" id="{27B76F85-1E44-45D7-9EB6-0A1E48C4C27D}"/>
                 </a:ext>
               </a:extLst>
             </p:cNvPr>
@@ -7978,7 +7978,7 @@
             <p:cNvPr id="34" name="Chart C" descr="Chart C">
               <a:extLst>
                 <a:ext uri="{FF2B5EF4-FFF2-40B4-BE49-F238E27FC236}">
-                  <a16:creationId xmlns="" xmlns:a16="http://schemas.microsoft.com/office/drawing/2014/main" id="{54B7E92B-B59E-40CE-9783-C3DA24D9EE30}"/>
+                  <a16:creationId xmlns:a16="http://schemas.microsoft.com/office/drawing/2014/main" xmlns="" id="{54B7E92B-B59E-40CE-9783-C3DA24D9EE30}"/>
                 </a:ext>
               </a:extLst>
             </p:cNvPr>
@@ -8008,7 +8008,7 @@
             <p:cNvPr id="35" name="Horizontal Section Divider" descr="Horizontal Divider">
               <a:extLst>
                 <a:ext uri="{FF2B5EF4-FFF2-40B4-BE49-F238E27FC236}">
-                  <a16:creationId xmlns="" xmlns:a16="http://schemas.microsoft.com/office/drawing/2014/main" id="{B5BC0675-3AC2-41E8-8911-7FC255A8C545}"/>
+                  <a16:creationId xmlns:a16="http://schemas.microsoft.com/office/drawing/2014/main" xmlns="" id="{B5BC0675-3AC2-41E8-8911-7FC255A8C545}"/>
                 </a:ext>
               </a:extLst>
             </p:cNvPr>
@@ -8395,7 +8395,7 @@
           <p:cNvPr id="22" name="Content Placeholder 95">
             <a:extLst>
               <a:ext uri="{FF2B5EF4-FFF2-40B4-BE49-F238E27FC236}">
-                <a16:creationId xmlns="" xmlns:a16="http://schemas.microsoft.com/office/drawing/2014/main" id="{604FDFA6-3867-48F0-AF0B-C0886374C85A}"/>
+                <a16:creationId xmlns:a16="http://schemas.microsoft.com/office/drawing/2014/main" xmlns="" id="{604FDFA6-3867-48F0-AF0B-C0886374C85A}"/>
               </a:ext>
             </a:extLst>
           </p:cNvPr>
@@ -8692,8 +8692,28 @@
               <a:rPr lang="en-US" sz="6000" dirty="0" smtClean="0">
                 <a:cs typeface="B Lotus" panose="00000400000000000000" pitchFamily="2" charset="-78"/>
               </a:rPr>
-              <a:t>your poster.</a:t>
-            </a:r>
+              <a:t>your </a:t>
+            </a:r>
+            <a:r>
+              <a:rPr lang="en-US" sz="6000" smtClean="0">
+                <a:cs typeface="B Lotus" panose="00000400000000000000" pitchFamily="2" charset="-78"/>
+              </a:rPr>
+              <a:t>poster</a:t>
+            </a:r>
+            <a:r>
+              <a:rPr lang="en-US" sz="6000" smtClean="0">
+                <a:cs typeface="B Lotus" panose="00000400000000000000" pitchFamily="2" charset="-78"/>
+              </a:rPr>
+              <a:t>.</a:t>
+            </a:r>
+          </a:p>
+          <a:p>
+            <a:pPr marL="0" indent="0" algn="just">
+              <a:buNone/>
+            </a:pPr>
+            <a:endParaRPr lang="en-US" sz="6000" dirty="0" smtClean="0">
+              <a:cs typeface="B Lotus" panose="00000400000000000000" pitchFamily="2" charset="-78"/>
+            </a:endParaRPr>
           </a:p>
           <a:p>
             <a:pPr marL="0" indent="0" algn="just">
@@ -9363,7 +9383,7 @@
           <p:cNvPr id="21" name="Data Table " descr="Table 1">
             <a:extLst>
               <a:ext uri="{FF2B5EF4-FFF2-40B4-BE49-F238E27FC236}">
-                <a16:creationId xmlns:a16="http://schemas.microsoft.com/office/drawing/2014/main" xmlns="" id="{32D44B4F-618F-427D-9B6A-5B20AC8DE682}"/>
+                <a16:creationId xmlns="" xmlns:a16="http://schemas.microsoft.com/office/drawing/2014/main" id="{32D44B4F-618F-427D-9B6A-5B20AC8DE682}"/>
               </a:ext>
             </a:extLst>
           </p:cNvPr>
@@ -9392,28 +9412,28 @@
                 <a:gridCol w="3191568">
                   <a:extLst>
                     <a:ext uri="{9D8B030D-6E8A-4147-A177-3AD203B41FA5}">
-                      <a16:colId xmlns:a16="http://schemas.microsoft.com/office/drawing/2014/main" xmlns="" val="20000"/>
+                      <a16:colId xmlns="" xmlns:a16="http://schemas.microsoft.com/office/drawing/2014/main" val="20000"/>
                     </a:ext>
                   </a:extLst>
                 </a:gridCol>
                 <a:gridCol w="3568522">
                   <a:extLst>
                     <a:ext uri="{9D8B030D-6E8A-4147-A177-3AD203B41FA5}">
-                      <a16:colId xmlns:a16="http://schemas.microsoft.com/office/drawing/2014/main" xmlns="" val="20001"/>
+                      <a16:colId xmlns="" xmlns:a16="http://schemas.microsoft.com/office/drawing/2014/main" val="20001"/>
                     </a:ext>
                   </a:extLst>
                 </a:gridCol>
                 <a:gridCol w="3166441">
                   <a:extLst>
                     <a:ext uri="{9D8B030D-6E8A-4147-A177-3AD203B41FA5}">
-                      <a16:colId xmlns:a16="http://schemas.microsoft.com/office/drawing/2014/main" xmlns="" val="20002"/>
+                      <a16:colId xmlns="" xmlns:a16="http://schemas.microsoft.com/office/drawing/2014/main" val="20002"/>
                     </a:ext>
                   </a:extLst>
                 </a:gridCol>
                 <a:gridCol w="3744433">
                   <a:extLst>
                     <a:ext uri="{9D8B030D-6E8A-4147-A177-3AD203B41FA5}">
-                      <a16:colId xmlns:a16="http://schemas.microsoft.com/office/drawing/2014/main" xmlns="" val="20003"/>
+                      <a16:colId xmlns="" xmlns:a16="http://schemas.microsoft.com/office/drawing/2014/main" val="20003"/>
                     </a:ext>
                   </a:extLst>
                 </a:gridCol>
@@ -9671,7 +9691,7 @@
                 </a:tc>
                 <a:extLst>
                   <a:ext uri="{0D108BD9-81ED-4DB2-BD59-A6C34878D82A}">
-                    <a16:rowId xmlns:a16="http://schemas.microsoft.com/office/drawing/2014/main" xmlns="" val="10000"/>
+                    <a16:rowId xmlns="" xmlns:a16="http://schemas.microsoft.com/office/drawing/2014/main" val="10000"/>
                   </a:ext>
                 </a:extLst>
               </a:tr>
@@ -9938,7 +9958,7 @@
                 </a:tc>
                 <a:extLst>
                   <a:ext uri="{0D108BD9-81ED-4DB2-BD59-A6C34878D82A}">
-                    <a16:rowId xmlns:a16="http://schemas.microsoft.com/office/drawing/2014/main" xmlns="" val="10001"/>
+                    <a16:rowId xmlns="" xmlns:a16="http://schemas.microsoft.com/office/drawing/2014/main" val="10001"/>
                   </a:ext>
                 </a:extLst>
               </a:tr>
@@ -10213,7 +10233,7 @@
                 </a:tc>
                 <a:extLst>
                   <a:ext uri="{0D108BD9-81ED-4DB2-BD59-A6C34878D82A}">
-                    <a16:rowId xmlns:a16="http://schemas.microsoft.com/office/drawing/2014/main" xmlns="" val="10002"/>
+                    <a16:rowId xmlns="" xmlns:a16="http://schemas.microsoft.com/office/drawing/2014/main" val="10002"/>
                   </a:ext>
                 </a:extLst>
               </a:tr>
@@ -10488,7 +10508,7 @@
                 </a:tc>
                 <a:extLst>
                   <a:ext uri="{0D108BD9-81ED-4DB2-BD59-A6C34878D82A}">
-                    <a16:rowId xmlns:a16="http://schemas.microsoft.com/office/drawing/2014/main" xmlns="" val="10003"/>
+                    <a16:rowId xmlns="" xmlns:a16="http://schemas.microsoft.com/office/drawing/2014/main" val="10003"/>
                   </a:ext>
                 </a:extLst>
               </a:tr>
@@ -10763,7 +10783,7 @@
                 </a:tc>
                 <a:extLst>
                   <a:ext uri="{0D108BD9-81ED-4DB2-BD59-A6C34878D82A}">
-                    <a16:rowId xmlns:a16="http://schemas.microsoft.com/office/drawing/2014/main" xmlns="" val="10004"/>
+                    <a16:rowId xmlns="" xmlns:a16="http://schemas.microsoft.com/office/drawing/2014/main" val="10004"/>
                   </a:ext>
                 </a:extLst>
               </a:tr>
@@ -11030,7 +11050,7 @@
                 </a:tc>
                 <a:extLst>
                   <a:ext uri="{0D108BD9-81ED-4DB2-BD59-A6C34878D82A}">
-                    <a16:rowId xmlns:a16="http://schemas.microsoft.com/office/drawing/2014/main" xmlns="" val="10005"/>
+                    <a16:rowId xmlns="" xmlns:a16="http://schemas.microsoft.com/office/drawing/2014/main" val="10005"/>
                   </a:ext>
                 </a:extLst>
               </a:tr>
@@ -11043,7 +11063,7 @@
           <p:cNvPr id="23" name="Content Placeholder 92">
             <a:extLst>
               <a:ext uri="{FF2B5EF4-FFF2-40B4-BE49-F238E27FC236}">
-                <a16:creationId xmlns="" xmlns:a16="http://schemas.microsoft.com/office/drawing/2014/main" id="{CD429459-56A1-49C8-BDCA-6BF803974182}"/>
+                <a16:creationId xmlns:a16="http://schemas.microsoft.com/office/drawing/2014/main" xmlns="" id="{CD429459-56A1-49C8-BDCA-6BF803974182}"/>
               </a:ext>
             </a:extLst>
           </p:cNvPr>
@@ -11361,7 +11381,7 @@
           <p:cNvPr id="26" name="Content Placeholder 95">
             <a:extLst>
               <a:ext uri="{FF2B5EF4-FFF2-40B4-BE49-F238E27FC236}">
-                <a16:creationId xmlns="" xmlns:a16="http://schemas.microsoft.com/office/drawing/2014/main" id="{604FDFA6-3867-48F0-AF0B-C0886374C85A}"/>
+                <a16:creationId xmlns:a16="http://schemas.microsoft.com/office/drawing/2014/main" xmlns="" id="{604FDFA6-3867-48F0-AF0B-C0886374C85A}"/>
               </a:ext>
             </a:extLst>
           </p:cNvPr>
@@ -11581,7 +11601,7 @@
           <p:cNvPr id="27" name="Content Placeholder 95">
             <a:extLst>
               <a:ext uri="{FF2B5EF4-FFF2-40B4-BE49-F238E27FC236}">
-                <a16:creationId xmlns="" xmlns:a16="http://schemas.microsoft.com/office/drawing/2014/main" id="{604FDFA6-3867-48F0-AF0B-C0886374C85A}"/>
+                <a16:creationId xmlns:a16="http://schemas.microsoft.com/office/drawing/2014/main" xmlns="" id="{604FDFA6-3867-48F0-AF0B-C0886374C85A}"/>
               </a:ext>
             </a:extLst>
           </p:cNvPr>
@@ -11804,7 +11824,7 @@
           <p:cNvPr id="28" name="Content Placeholder 95">
             <a:extLst>
               <a:ext uri="{FF2B5EF4-FFF2-40B4-BE49-F238E27FC236}">
-                <a16:creationId xmlns="" xmlns:a16="http://schemas.microsoft.com/office/drawing/2014/main" id="{604FDFA6-3867-48F0-AF0B-C0886374C85A}"/>
+                <a16:creationId xmlns:a16="http://schemas.microsoft.com/office/drawing/2014/main" xmlns="" id="{604FDFA6-3867-48F0-AF0B-C0886374C85A}"/>
               </a:ext>
             </a:extLst>
           </p:cNvPr>
@@ -12051,7 +12071,7 @@
             <p:cNvPr id="29" name="Horizontal Section Divider" descr="Horizontal Divider">
               <a:extLst>
                 <a:ext uri="{FF2B5EF4-FFF2-40B4-BE49-F238E27FC236}">
-                  <a16:creationId xmlns="" xmlns:a16="http://schemas.microsoft.com/office/drawing/2014/main" id="{4E4A0ECF-1721-4D14-A87E-1CA7298CE609}"/>
+                  <a16:creationId xmlns:a16="http://schemas.microsoft.com/office/drawing/2014/main" xmlns="" id="{4E4A0ECF-1721-4D14-A87E-1CA7298CE609}"/>
                 </a:ext>
               </a:extLst>
             </p:cNvPr>
@@ -12086,7 +12106,7 @@
             <p:cNvPr id="30" name="Bullet B" descr="B">
               <a:extLst>
                 <a:ext uri="{FF2B5EF4-FFF2-40B4-BE49-F238E27FC236}">
-                  <a16:creationId xmlns="" xmlns:a16="http://schemas.microsoft.com/office/drawing/2014/main" id="{E96A507C-9D5F-436E-A44C-D0FE6E561AA2}"/>
+                  <a16:creationId xmlns:a16="http://schemas.microsoft.com/office/drawing/2014/main" xmlns="" id="{E96A507C-9D5F-436E-A44C-D0FE6E561AA2}"/>
                 </a:ext>
               </a:extLst>
             </p:cNvPr>
@@ -12122,7 +12142,7 @@
             <p:cNvPr id="31" name="Chart B" descr="Chart B">
               <a:extLst>
                 <a:ext uri="{FF2B5EF4-FFF2-40B4-BE49-F238E27FC236}">
-                  <a16:creationId xmlns="" xmlns:a16="http://schemas.microsoft.com/office/drawing/2014/main" id="{4A43E018-FCB5-4328-A2A6-F68CA83B1220}"/>
+                  <a16:creationId xmlns:a16="http://schemas.microsoft.com/office/drawing/2014/main" xmlns="" id="{4A43E018-FCB5-4328-A2A6-F68CA83B1220}"/>
                 </a:ext>
               </a:extLst>
             </p:cNvPr>
@@ -12152,7 +12172,7 @@
             <p:cNvPr id="32" name="Vertical Section Divider" descr="Vertical Divider">
               <a:extLst>
                 <a:ext uri="{FF2B5EF4-FFF2-40B4-BE49-F238E27FC236}">
-                  <a16:creationId xmlns="" xmlns:a16="http://schemas.microsoft.com/office/drawing/2014/main" id="{E4ADC138-F3B0-4BA4-B52F-C538CC195447}"/>
+                  <a16:creationId xmlns:a16="http://schemas.microsoft.com/office/drawing/2014/main" xmlns="" id="{E4ADC138-F3B0-4BA4-B52F-C538CC195447}"/>
                 </a:ext>
               </a:extLst>
             </p:cNvPr>
@@ -12187,7 +12207,7 @@
             <p:cNvPr id="33" name="Bullet C" descr="C">
               <a:extLst>
                 <a:ext uri="{FF2B5EF4-FFF2-40B4-BE49-F238E27FC236}">
-                  <a16:creationId xmlns="" xmlns:a16="http://schemas.microsoft.com/office/drawing/2014/main" id="{27B76F85-1E44-45D7-9EB6-0A1E48C4C27D}"/>
+                  <a16:creationId xmlns:a16="http://schemas.microsoft.com/office/drawing/2014/main" xmlns="" id="{27B76F85-1E44-45D7-9EB6-0A1E48C4C27D}"/>
                 </a:ext>
               </a:extLst>
             </p:cNvPr>
@@ -12223,7 +12243,7 @@
             <p:cNvPr id="34" name="Chart C" descr="Chart C">
               <a:extLst>
                 <a:ext uri="{FF2B5EF4-FFF2-40B4-BE49-F238E27FC236}">
-                  <a16:creationId xmlns="" xmlns:a16="http://schemas.microsoft.com/office/drawing/2014/main" id="{54B7E92B-B59E-40CE-9783-C3DA24D9EE30}"/>
+                  <a16:creationId xmlns:a16="http://schemas.microsoft.com/office/drawing/2014/main" xmlns="" id="{54B7E92B-B59E-40CE-9783-C3DA24D9EE30}"/>
                 </a:ext>
               </a:extLst>
             </p:cNvPr>
@@ -12253,7 +12273,7 @@
             <p:cNvPr id="35" name="Horizontal Section Divider" descr="Horizontal Divider">
               <a:extLst>
                 <a:ext uri="{FF2B5EF4-FFF2-40B4-BE49-F238E27FC236}">
-                  <a16:creationId xmlns="" xmlns:a16="http://schemas.microsoft.com/office/drawing/2014/main" id="{B5BC0675-3AC2-41E8-8911-7FC255A8C545}"/>
+                  <a16:creationId xmlns:a16="http://schemas.microsoft.com/office/drawing/2014/main" xmlns="" id="{B5BC0675-3AC2-41E8-8911-7FC255A8C545}"/>
                 </a:ext>
               </a:extLst>
             </p:cNvPr>

</xml_diff>